<commit_message>
Se agregaron las paginas de galeria y la de cursos. Se arreglaron las secciones de los talleres. Se agrego la funcion modal a la galeria. Se agrego la funcion de enviar a la pagina de contacto
</commit_message>
<xml_diff>
--- a/informacion/Presentación1.pptx
+++ b/informacion/Presentación1.pptx
@@ -7,6 +7,7 @@
   <p:sldIdLst>
     <p:sldId id="256" r:id="rId2"/>
     <p:sldId id="257" r:id="rId3"/>
+    <p:sldId id="258" r:id="rId4"/>
   </p:sldIdLst>
   <p:sldSz cx="9144000" cy="6858000" type="screen4x3"/>
   <p:notesSz cx="6858000" cy="9144000"/>
@@ -289,7 +290,7 @@
           <a:p>
             <a:fld id="{1968B4B0-28C3-41D9-A565-14E939893E7A}" type="datetimeFigureOut">
               <a:rPr lang="es-AR" smtClean="0"/>
-              <a:t>4/5/2020</a:t>
+              <a:t>8/5/2020</a:t>
             </a:fld>
             <a:endParaRPr lang="es-AR"/>
           </a:p>
@@ -459,7 +460,7 @@
           <a:p>
             <a:fld id="{1968B4B0-28C3-41D9-A565-14E939893E7A}" type="datetimeFigureOut">
               <a:rPr lang="es-AR" smtClean="0"/>
-              <a:t>4/5/2020</a:t>
+              <a:t>8/5/2020</a:t>
             </a:fld>
             <a:endParaRPr lang="es-AR"/>
           </a:p>
@@ -639,7 +640,7 @@
           <a:p>
             <a:fld id="{1968B4B0-28C3-41D9-A565-14E939893E7A}" type="datetimeFigureOut">
               <a:rPr lang="es-AR" smtClean="0"/>
-              <a:t>4/5/2020</a:t>
+              <a:t>8/5/2020</a:t>
             </a:fld>
             <a:endParaRPr lang="es-AR"/>
           </a:p>
@@ -809,7 +810,7 @@
           <a:p>
             <a:fld id="{1968B4B0-28C3-41D9-A565-14E939893E7A}" type="datetimeFigureOut">
               <a:rPr lang="es-AR" smtClean="0"/>
-              <a:t>4/5/2020</a:t>
+              <a:t>8/5/2020</a:t>
             </a:fld>
             <a:endParaRPr lang="es-AR"/>
           </a:p>
@@ -1055,7 +1056,7 @@
           <a:p>
             <a:fld id="{1968B4B0-28C3-41D9-A565-14E939893E7A}" type="datetimeFigureOut">
               <a:rPr lang="es-AR" smtClean="0"/>
-              <a:t>4/5/2020</a:t>
+              <a:t>8/5/2020</a:t>
             </a:fld>
             <a:endParaRPr lang="es-AR"/>
           </a:p>
@@ -1343,7 +1344,7 @@
           <a:p>
             <a:fld id="{1968B4B0-28C3-41D9-A565-14E939893E7A}" type="datetimeFigureOut">
               <a:rPr lang="es-AR" smtClean="0"/>
-              <a:t>4/5/2020</a:t>
+              <a:t>8/5/2020</a:t>
             </a:fld>
             <a:endParaRPr lang="es-AR"/>
           </a:p>
@@ -1765,7 +1766,7 @@
           <a:p>
             <a:fld id="{1968B4B0-28C3-41D9-A565-14E939893E7A}" type="datetimeFigureOut">
               <a:rPr lang="es-AR" smtClean="0"/>
-              <a:t>4/5/2020</a:t>
+              <a:t>8/5/2020</a:t>
             </a:fld>
             <a:endParaRPr lang="es-AR"/>
           </a:p>
@@ -1883,7 +1884,7 @@
           <a:p>
             <a:fld id="{1968B4B0-28C3-41D9-A565-14E939893E7A}" type="datetimeFigureOut">
               <a:rPr lang="es-AR" smtClean="0"/>
-              <a:t>4/5/2020</a:t>
+              <a:t>8/5/2020</a:t>
             </a:fld>
             <a:endParaRPr lang="es-AR"/>
           </a:p>
@@ -1978,7 +1979,7 @@
           <a:p>
             <a:fld id="{1968B4B0-28C3-41D9-A565-14E939893E7A}" type="datetimeFigureOut">
               <a:rPr lang="es-AR" smtClean="0"/>
-              <a:t>4/5/2020</a:t>
+              <a:t>8/5/2020</a:t>
             </a:fld>
             <a:endParaRPr lang="es-AR"/>
           </a:p>
@@ -2255,7 +2256,7 @@
           <a:p>
             <a:fld id="{1968B4B0-28C3-41D9-A565-14E939893E7A}" type="datetimeFigureOut">
               <a:rPr lang="es-AR" smtClean="0"/>
-              <a:t>4/5/2020</a:t>
+              <a:t>8/5/2020</a:t>
             </a:fld>
             <a:endParaRPr lang="es-AR"/>
           </a:p>
@@ -2508,7 +2509,7 @@
           <a:p>
             <a:fld id="{1968B4B0-28C3-41D9-A565-14E939893E7A}" type="datetimeFigureOut">
               <a:rPr lang="es-AR" smtClean="0"/>
-              <a:t>4/5/2020</a:t>
+              <a:t>8/5/2020</a:t>
             </a:fld>
             <a:endParaRPr lang="es-AR"/>
           </a:p>
@@ -2721,7 +2722,7 @@
           <a:p>
             <a:fld id="{1968B4B0-28C3-41D9-A565-14E939893E7A}" type="datetimeFigureOut">
               <a:rPr lang="es-AR" smtClean="0"/>
-              <a:t>4/5/2020</a:t>
+              <a:t>8/5/2020</a:t>
             </a:fld>
             <a:endParaRPr lang="es-AR"/>
           </a:p>
@@ -3555,6 +3556,36 @@
 </p:sld>
 </file>
 
+<file path=ppt/slides/slide3.xml><?xml version="1.0" encoding="utf-8"?>
+<p:sld xmlns:a="http://schemas.openxmlformats.org/drawingml/2006/main" xmlns:r="http://schemas.openxmlformats.org/officeDocument/2006/relationships" xmlns:p="http://schemas.openxmlformats.org/presentationml/2006/main">
+  <p:cSld>
+    <p:spTree>
+      <p:nvGrpSpPr>
+        <p:cNvPr id="1" name=""/>
+        <p:cNvGrpSpPr/>
+        <p:nvPr/>
+      </p:nvGrpSpPr>
+      <p:grpSpPr>
+        <a:xfrm>
+          <a:off x="0" y="0"/>
+          <a:ext cx="0" cy="0"/>
+          <a:chOff x="0" y="0"/>
+          <a:chExt cx="0" cy="0"/>
+        </a:xfrm>
+      </p:grpSpPr>
+    </p:spTree>
+    <p:extLst>
+      <p:ext uri="{BB962C8B-B14F-4D97-AF65-F5344CB8AC3E}">
+        <p14:creationId xmlns:p14="http://schemas.microsoft.com/office/powerpoint/2010/main" val="2957150504"/>
+      </p:ext>
+    </p:extLst>
+  </p:cSld>
+  <p:clrMapOvr>
+    <a:masterClrMapping/>
+  </p:clrMapOvr>
+</p:sld>
+</file>
+
 <file path=ppt/theme/theme1.xml><?xml version="1.0" encoding="utf-8"?>
 <a:theme xmlns:a="http://schemas.openxmlformats.org/drawingml/2006/main" name="Tema de Office">
   <a:themeElements>

</xml_diff>